<commit_message>
tweak slidesS13/genfuncintro genfunccount geometric-sums
</commit_message>
<xml_diff>
--- a/spring13/slidesS13/genfunccount.pptx
+++ b/spring13/slidesS13/genfunccount.pptx
@@ -4376,7 +4376,7 @@
           <a:graphicData uri="http://schemas.openxmlformats.org/presentationml/2006/ole">
             <mc:AlternateContent xmlns:mc="http://schemas.openxmlformats.org/markup-compatibility/2006">
               <mc:Choice xmlns:v="urn:schemas-microsoft-com:vml" Requires="v">
-                <p:oleObj spid="_x0000_s330839" name="Equation" r:id="rId4" imgW="990360" imgH="571320" progId="Equation.DSMT4">
+                <p:oleObj spid="_x0000_s330844" name="Equation" r:id="rId4" imgW="990360" imgH="571320" progId="Equation.DSMT4">
                   <p:embed/>
                 </p:oleObj>
               </mc:Choice>
@@ -4452,7 +4452,7 @@
           <a:graphicData uri="http://schemas.openxmlformats.org/presentationml/2006/ole">
             <mc:AlternateContent xmlns:mc="http://schemas.openxmlformats.org/markup-compatibility/2006">
               <mc:Choice xmlns:v="urn:schemas-microsoft-com:vml" Requires="v">
-                <p:oleObj spid="_x0000_s330840" name="Equation" r:id="rId6" imgW="2108200" imgH="1511300" progId="Equation.DSMT4">
+                <p:oleObj spid="_x0000_s330845" name="Equation" r:id="rId6" imgW="2108200" imgH="1511300" progId="Equation.DSMT4">
                   <p:embed/>
                 </p:oleObj>
               </mc:Choice>
@@ -4512,7 +4512,7 @@
           <a:graphicData uri="http://schemas.openxmlformats.org/presentationml/2006/ole">
             <mc:AlternateContent xmlns:mc="http://schemas.openxmlformats.org/markup-compatibility/2006">
               <mc:Choice xmlns:v="urn:schemas-microsoft-com:vml" Requires="v">
-                <p:oleObj spid="_x0000_s330841" name="Equation" r:id="rId8" imgW="4609800" imgH="1231560" progId="Equation.DSMT4">
+                <p:oleObj spid="_x0000_s330846" name="Equation" r:id="rId8" imgW="4609800" imgH="1231560" progId="Equation.DSMT4">
                   <p:embed/>
                 </p:oleObj>
               </mc:Choice>
@@ -4582,7 +4582,7 @@
           <a:graphicData uri="http://schemas.openxmlformats.org/presentationml/2006/ole">
             <mc:AlternateContent xmlns:mc="http://schemas.openxmlformats.org/markup-compatibility/2006">
               <mc:Choice xmlns:v="urn:schemas-microsoft-com:vml" Requires="v">
-                <p:oleObj spid="_x0000_s330842" name="Equation" r:id="rId10" imgW="4063680" imgH="571320" progId="Equation.DSMT4">
+                <p:oleObj spid="_x0000_s330847" name="Equation" r:id="rId10" imgW="4063680" imgH="571320" progId="Equation.DSMT4">
                   <p:embed/>
                 </p:oleObj>
               </mc:Choice>
@@ -4993,11 +4993,7 @@
           <a:p>
             <a:r>
               <a:rPr lang="en-US" dirty="0" smtClean="0"/>
-              <a:t>A Familiar Generating </a:t>
-            </a:r>
-            <a:r>
-              <a:rPr lang="en-US" dirty="0" smtClean="0"/>
-              <a:t>Function</a:t>
+              <a:t>A Familiar Generating Function</a:t>
             </a:r>
             <a:endParaRPr lang="en-US" dirty="0"/>
           </a:p>
@@ -5160,7 +5156,7 @@
           <a:graphicData uri="http://schemas.openxmlformats.org/presentationml/2006/ole">
             <mc:AlternateContent xmlns:mc="http://schemas.openxmlformats.org/markup-compatibility/2006">
               <mc:Choice xmlns:v="urn:schemas-microsoft-com:vml" Requires="v">
-                <p:oleObj spid="_x0000_s332827" name="Equation" r:id="rId4" imgW="2044700" imgH="965200" progId="Equation.DSMT4">
+                <p:oleObj spid="_x0000_s332829" name="Equation" r:id="rId4" imgW="2044700" imgH="965200" progId="Equation.DSMT4">
                   <p:embed/>
                 </p:oleObj>
               </mc:Choice>
@@ -5394,7 +5390,7 @@
           <a:graphicData uri="http://schemas.openxmlformats.org/presentationml/2006/ole">
             <mc:AlternateContent xmlns:mc="http://schemas.openxmlformats.org/markup-compatibility/2006">
               <mc:Choice xmlns:v="urn:schemas-microsoft-com:vml" Requires="v">
-                <p:oleObj spid="_x0000_s234553" name="Equation" r:id="rId4" imgW="2717800" imgH="1511300" progId="Equation.DSMT4">
+                <p:oleObj spid="_x0000_s234555" name="Equation" r:id="rId4" imgW="2717800" imgH="1511300" progId="Equation.DSMT4">
                   <p:embed/>
                 </p:oleObj>
               </mc:Choice>
@@ -5973,7 +5969,7 @@
           <a:graphicData uri="http://schemas.openxmlformats.org/presentationml/2006/ole">
             <mc:AlternateContent xmlns:mc="http://schemas.openxmlformats.org/markup-compatibility/2006">
               <mc:Choice xmlns:v="urn:schemas-microsoft-com:vml" Requires="v">
-                <p:oleObj spid="_x0000_s339989" name="Equation" r:id="rId4" imgW="1358900" imgH="495300" progId="Equation.DSMT4">
+                <p:oleObj spid="_x0000_s339991" name="Equation" r:id="rId4" imgW="1358900" imgH="495300" progId="Equation.DSMT4">
                   <p:embed/>
                 </p:oleObj>
               </mc:Choice>
@@ -6186,7 +6182,7 @@
           <a:graphicData uri="http://schemas.openxmlformats.org/presentationml/2006/ole">
             <mc:AlternateContent xmlns:mc="http://schemas.openxmlformats.org/markup-compatibility/2006">
               <mc:Choice xmlns:v="urn:schemas-microsoft-com:vml" Requires="v">
-                <p:oleObj spid="_x0000_s333846" name="Equation" r:id="rId4" imgW="2095500" imgH="914400" progId="Equation.DSMT4">
+                <p:oleObj spid="_x0000_s333848" name="Equation" r:id="rId4" imgW="2095500" imgH="914400" progId="Equation.DSMT4">
                   <p:embed/>
                 </p:oleObj>
               </mc:Choice>
@@ -7085,7 +7081,7 @@
           <a:graphicData uri="http://schemas.openxmlformats.org/presentationml/2006/ole">
             <mc:AlternateContent xmlns:mc="http://schemas.openxmlformats.org/markup-compatibility/2006">
               <mc:Choice xmlns:v="urn:schemas-microsoft-com:vml" Requires="v">
-                <p:oleObj spid="_x0000_s164914" name="Equation" r:id="rId3" imgW="7886700" imgH="914400" progId="Equation.DSMT4">
+                <p:oleObj spid="_x0000_s164916" name="Equation" r:id="rId3" imgW="7886700" imgH="914400" progId="Equation.DSMT4">
                   <p:embed/>
                 </p:oleObj>
               </mc:Choice>
@@ -7488,7 +7484,7 @@
           <a:graphicData uri="http://schemas.openxmlformats.org/presentationml/2006/ole">
             <mc:AlternateContent xmlns:mc="http://schemas.openxmlformats.org/markup-compatibility/2006">
               <mc:Choice xmlns:v="urn:schemas-microsoft-com:vml" Requires="v">
-                <p:oleObj spid="_x0000_s181343" name="Equation" r:id="rId3" imgW="165100" imgH="673100" progId="Equation.DSMT4">
+                <p:oleObj spid="_x0000_s181349" name="Equation" r:id="rId3" imgW="165100" imgH="673100" progId="Equation.DSMT4">
                   <p:embed/>
                 </p:oleObj>
               </mc:Choice>
@@ -7736,7 +7732,7 @@
           <a:graphicData uri="http://schemas.openxmlformats.org/presentationml/2006/ole">
             <mc:AlternateContent xmlns:mc="http://schemas.openxmlformats.org/markup-compatibility/2006">
               <mc:Choice xmlns:v="urn:schemas-microsoft-com:vml" Requires="v">
-                <p:oleObj spid="_x0000_s181344" name="Equation" r:id="rId5" imgW="165100" imgH="673100" progId="Equation.DSMT4">
+                <p:oleObj spid="_x0000_s181350" name="Equation" r:id="rId5" imgW="165100" imgH="673100" progId="Equation.DSMT4">
                   <p:embed/>
                 </p:oleObj>
               </mc:Choice>
@@ -7902,7 +7898,15 @@
                     <a:srgbClr val="E1B400"/>
                   </a:solidFill>
                 </a:rPr>
-                <a:t>12-j</a:t>
+                <a:t>12</a:t>
+              </a:r>
+              <a:r>
+                <a:rPr lang="en-US" baseline="-25000" dirty="0" smtClean="0">
+                  <a:solidFill>
+                    <a:srgbClr val="E1B400"/>
+                  </a:solidFill>
+                </a:rPr>
+                <a:t>-i</a:t>
               </a:r>
               <a:endParaRPr lang="en-US" baseline="-25000" dirty="0">
                 <a:solidFill>
@@ -7935,7 +7939,7 @@
           <a:graphicData uri="http://schemas.openxmlformats.org/presentationml/2006/ole">
             <mc:AlternateContent xmlns:mc="http://schemas.openxmlformats.org/markup-compatibility/2006">
               <mc:Choice xmlns:v="urn:schemas-microsoft-com:vml" Requires="v">
-                <p:oleObj spid="_x0000_s181345" name="Equation" r:id="rId7" imgW="393700" imgH="165100" progId="Equation.DSMT4">
+                <p:oleObj spid="_x0000_s181351" name="Equation" r:id="rId7" imgW="393700" imgH="165100" progId="Equation.DSMT4">
                   <p:embed/>
                 </p:oleObj>
               </mc:Choice>
@@ -7992,7 +7996,7 @@
           <a:graphicData uri="http://schemas.openxmlformats.org/presentationml/2006/ole">
             <mc:AlternateContent xmlns:mc="http://schemas.openxmlformats.org/markup-compatibility/2006">
               <mc:Choice xmlns:v="urn:schemas-microsoft-com:vml" Requires="v">
-                <p:oleObj spid="_x0000_s181346" name="Equation" r:id="rId9" imgW="431800" imgH="177800" progId="Equation.DSMT4">
+                <p:oleObj spid="_x0000_s181352" name="Equation" r:id="rId9" imgW="431800" imgH="177800" progId="Equation.DSMT4">
                   <p:embed/>
                 </p:oleObj>
               </mc:Choice>
@@ -8049,7 +8053,7 @@
           <a:graphicData uri="http://schemas.openxmlformats.org/presentationml/2006/ole">
             <mc:AlternateContent xmlns:mc="http://schemas.openxmlformats.org/markup-compatibility/2006">
               <mc:Choice xmlns:v="urn:schemas-microsoft-com:vml" Requires="v">
-                <p:oleObj spid="_x0000_s181347" name="Equation" r:id="rId11" imgW="393700" imgH="165100" progId="Equation.DSMT4">
+                <p:oleObj spid="_x0000_s181353" name="Equation" r:id="rId11" imgW="393700" imgH="165100" progId="Equation.DSMT4">
                   <p:embed/>
                 </p:oleObj>
               </mc:Choice>
@@ -8987,7 +8991,7 @@
           <a:graphicData uri="http://schemas.openxmlformats.org/presentationml/2006/ole">
             <mc:AlternateContent xmlns:mc="http://schemas.openxmlformats.org/markup-compatibility/2006">
               <mc:Choice xmlns:v="urn:schemas-microsoft-com:vml" Requires="v">
-                <p:oleObj spid="_x0000_s349187" name="Equation" r:id="rId3" imgW="7886700" imgH="914400" progId="Equation.DSMT4">
+                <p:oleObj spid="_x0000_s349189" name="Equation" r:id="rId3" imgW="7886700" imgH="914400" progId="Equation.DSMT4">
                   <p:embed/>
                 </p:oleObj>
               </mc:Choice>
@@ -9060,6 +9064,9 @@
                     <p:cTn id="3" fill="hold">
                       <p:stCondLst>
                         <p:cond delay="indefinite"/>
+                        <p:cond evt="onBegin" delay="0">
+                          <p:tn val="2"/>
+                        </p:cond>
                       </p:stCondLst>
                       <p:childTnLst>
                         <p:par>
@@ -9069,7 +9076,7 @@
                             </p:stCondLst>
                             <p:childTnLst>
                               <p:par>
-                                <p:cTn id="5" presetID="10" presetClass="entr" presetSubtype="0" fill="hold" grpId="0" nodeType="clickEffect">
+                                <p:cTn id="5" presetID="10" presetClass="entr" presetSubtype="0" fill="hold" grpId="0" nodeType="afterEffect">
                                   <p:stCondLst>
                                     <p:cond delay="0"/>
                                   </p:stCondLst>
@@ -9501,7 +9508,7 @@
           <a:graphicData uri="http://schemas.openxmlformats.org/presentationml/2006/ole">
             <mc:AlternateContent xmlns:mc="http://schemas.openxmlformats.org/markup-compatibility/2006">
               <mc:Choice xmlns:v="urn:schemas-microsoft-com:vml" Requires="v">
-                <p:oleObj spid="_x0000_s230525" name="Equation" r:id="rId3" imgW="2489200" imgH="914400" progId="Equation.DSMT4">
+                <p:oleObj spid="_x0000_s230531" name="Equation" r:id="rId3" imgW="2489200" imgH="914400" progId="Equation.DSMT4">
                   <p:embed/>
                 </p:oleObj>
               </mc:Choice>
@@ -9562,7 +9569,7 @@
           <a:graphicData uri="http://schemas.openxmlformats.org/presentationml/2006/ole">
             <mc:AlternateContent xmlns:mc="http://schemas.openxmlformats.org/markup-compatibility/2006">
               <mc:Choice xmlns:v="urn:schemas-microsoft-com:vml" Requires="v">
-                <p:oleObj spid="_x0000_s230526" name="Equation" r:id="rId5" imgW="8178800" imgH="774700" progId="Equation.3">
+                <p:oleObj spid="_x0000_s230532" name="Equation" r:id="rId5" imgW="8178800" imgH="774700" progId="Equation.3">
                   <p:embed/>
                 </p:oleObj>
               </mc:Choice>
@@ -9623,7 +9630,7 @@
           <a:graphicData uri="http://schemas.openxmlformats.org/presentationml/2006/ole">
             <mc:AlternateContent xmlns:mc="http://schemas.openxmlformats.org/markup-compatibility/2006">
               <mc:Choice xmlns:v="urn:schemas-microsoft-com:vml" Requires="v">
-                <p:oleObj spid="_x0000_s230527" name="Equation" r:id="rId7" imgW="7810500" imgH="762000" progId="Equation.DSMT4">
+                <p:oleObj spid="_x0000_s230533" name="Equation" r:id="rId7" imgW="7810500" imgH="762000" progId="Equation.DSMT4">
                   <p:embed/>
                 </p:oleObj>
               </mc:Choice>
@@ -9680,7 +9687,7 @@
           <a:graphicData uri="http://schemas.openxmlformats.org/presentationml/2006/ole">
             <mc:AlternateContent xmlns:mc="http://schemas.openxmlformats.org/markup-compatibility/2006">
               <mc:Choice xmlns:v="urn:schemas-microsoft-com:vml" Requires="v">
-                <p:oleObj spid="_x0000_s230528" name="Equation" r:id="rId9" imgW="6311900" imgH="914400" progId="Equation.DSMT4">
+                <p:oleObj spid="_x0000_s230534" name="Equation" r:id="rId9" imgW="6311900" imgH="914400" progId="Equation.DSMT4">
                   <p:embed/>
                 </p:oleObj>
               </mc:Choice>
@@ -9741,7 +9748,7 @@
           <a:graphicData uri="http://schemas.openxmlformats.org/presentationml/2006/ole">
             <mc:AlternateContent xmlns:mc="http://schemas.openxmlformats.org/markup-compatibility/2006">
               <mc:Choice xmlns:v="urn:schemas-microsoft-com:vml" Requires="v">
-                <p:oleObj spid="_x0000_s230529" name="Equation" r:id="rId11" imgW="3060700" imgH="914400" progId="Equation.DSMT4">
+                <p:oleObj spid="_x0000_s230535" name="Equation" r:id="rId11" imgW="3060700" imgH="914400" progId="Equation.DSMT4">
                   <p:embed/>
                 </p:oleObj>
               </mc:Choice>
@@ -10322,7 +10329,7 @@
           <a:graphicData uri="http://schemas.openxmlformats.org/presentationml/2006/ole">
             <mc:AlternateContent xmlns:mc="http://schemas.openxmlformats.org/markup-compatibility/2006">
               <mc:Choice xmlns:v="urn:schemas-microsoft-com:vml" Requires="v">
-                <p:oleObj spid="_x0000_s320559" name="Equation" r:id="rId3" imgW="762000" imgH="469900" progId="Equation.DSMT4">
+                <p:oleObj spid="_x0000_s320561" name="Equation" r:id="rId3" imgW="762000" imgH="469900" progId="Equation.DSMT4">
                   <p:embed/>
                 </p:oleObj>
               </mc:Choice>
@@ -10687,7 +10694,7 @@
           <a:graphicData uri="http://schemas.openxmlformats.org/presentationml/2006/ole">
             <mc:AlternateContent xmlns:mc="http://schemas.openxmlformats.org/markup-compatibility/2006">
               <mc:Choice xmlns:v="urn:schemas-microsoft-com:vml" Requires="v">
-                <p:oleObj spid="_x0000_s1035" name="Equation" r:id="rId4" imgW="6603840" imgH="2920680" progId="Equation.DSMT4">
+                <p:oleObj spid="_x0000_s1037" name="Equation" r:id="rId4" imgW="6603840" imgH="2920680" progId="Equation.DSMT4">
                   <p:embed/>
                 </p:oleObj>
               </mc:Choice>
@@ -10944,7 +10951,7 @@
           <a:graphicData uri="http://schemas.openxmlformats.org/presentationml/2006/ole">
             <mc:AlternateContent xmlns:mc="http://schemas.openxmlformats.org/markup-compatibility/2006">
               <mc:Choice xmlns:v="urn:schemas-microsoft-com:vml" Requires="v">
-                <p:oleObj spid="_x0000_s341004" name="Equation" r:id="rId4" imgW="6489700" imgH="850900" progId="Equation.DSMT4">
+                <p:oleObj spid="_x0000_s341006" name="Equation" r:id="rId4" imgW="6489700" imgH="850900" progId="Equation.DSMT4">
                   <p:embed/>
                 </p:oleObj>
               </mc:Choice>
@@ -11057,11 +11064,7 @@
             </a:r>
             <a:r>
               <a:rPr lang="en-US" sz="4800" dirty="0" smtClean="0"/>
-              <a:t>) </a:t>
-            </a:r>
-            <a:r>
-              <a:rPr lang="en-US" sz="4800" dirty="0" smtClean="0"/>
-              <a:t>oranges</a:t>
+              <a:t>) oranges</a:t>
             </a:r>
           </a:p>
           <a:p>
@@ -11113,11 +11116,7 @@
             </a:r>
             <a:r>
               <a:rPr lang="en-US" sz="4800" dirty="0" smtClean="0"/>
-              <a:t>) </a:t>
-            </a:r>
-            <a:r>
-              <a:rPr lang="en-US" sz="4800" dirty="0" smtClean="0"/>
-              <a:t>bananas</a:t>
+              <a:t>) bananas</a:t>
             </a:r>
             <a:endParaRPr lang="en-US" sz="4800" dirty="0"/>
           </a:p>
@@ -12437,7 +12436,7 @@
           <a:graphicData uri="http://schemas.openxmlformats.org/presentationml/2006/ole">
             <mc:AlternateContent xmlns:mc="http://schemas.openxmlformats.org/markup-compatibility/2006">
               <mc:Choice xmlns:v="urn:schemas-microsoft-com:vml" Requires="v">
-                <p:oleObj spid="_x0000_s82182" name="Equation" r:id="rId3" imgW="3454200" imgH="1396800" progId="Equation.DSMT4">
+                <p:oleObj spid="_x0000_s82191" name="Equation" r:id="rId3" imgW="3454200" imgH="1396800" progId="Equation.DSMT4">
                   <p:embed/>
                 </p:oleObj>
               </mc:Choice>
@@ -12625,7 +12624,7 @@
           <a:graphicData uri="http://schemas.openxmlformats.org/presentationml/2006/ole">
             <mc:AlternateContent xmlns:mc="http://schemas.openxmlformats.org/markup-compatibility/2006">
               <mc:Choice xmlns:v="urn:schemas-microsoft-com:vml" Requires="v">
-                <p:oleObj spid="_x0000_s82183" name="Equation" r:id="rId5" imgW="2895480" imgH="647640" progId="Equation.DSMT4">
+                <p:oleObj spid="_x0000_s82192" name="Equation" r:id="rId5" imgW="2895480" imgH="647640" progId="Equation.DSMT4">
                   <p:embed/>
                 </p:oleObj>
               </mc:Choice>
@@ -12695,7 +12694,7 @@
           <a:graphicData uri="http://schemas.openxmlformats.org/presentationml/2006/ole">
             <mc:AlternateContent xmlns:mc="http://schemas.openxmlformats.org/markup-compatibility/2006">
               <mc:Choice xmlns:v="urn:schemas-microsoft-com:vml" Requires="v">
-                <p:oleObj spid="_x0000_s82184" name="Equation" r:id="rId7" imgW="1295280" imgH="609480" progId="Equation.DSMT4">
+                <p:oleObj spid="_x0000_s82193" name="Equation" r:id="rId7" imgW="1295280" imgH="609480" progId="Equation.DSMT4">
                   <p:embed/>
                 </p:oleObj>
               </mc:Choice>
@@ -12765,7 +12764,7 @@
           <a:graphicData uri="http://schemas.openxmlformats.org/presentationml/2006/ole">
             <mc:AlternateContent xmlns:mc="http://schemas.openxmlformats.org/markup-compatibility/2006">
               <mc:Choice xmlns:v="urn:schemas-microsoft-com:vml" Requires="v">
-                <p:oleObj spid="_x0000_s82185" name="Equation" r:id="rId9" imgW="1295280" imgH="609480" progId="Equation.DSMT4">
+                <p:oleObj spid="_x0000_s82194" name="Equation" r:id="rId9" imgW="1295280" imgH="609480" progId="Equation.DSMT4">
                   <p:embed/>
                 </p:oleObj>
               </mc:Choice>
@@ -12835,7 +12834,7 @@
           <a:graphicData uri="http://schemas.openxmlformats.org/presentationml/2006/ole">
             <mc:AlternateContent xmlns:mc="http://schemas.openxmlformats.org/markup-compatibility/2006">
               <mc:Choice xmlns:v="urn:schemas-microsoft-com:vml" Requires="v">
-                <p:oleObj spid="_x0000_s82186" name="Equation" r:id="rId11" imgW="1295280" imgH="622080" progId="Equation.DSMT4">
+                <p:oleObj spid="_x0000_s82195" name="Equation" r:id="rId11" imgW="1295280" imgH="622080" progId="Equation.DSMT4">
                   <p:embed/>
                 </p:oleObj>
               </mc:Choice>
@@ -12905,7 +12904,7 @@
           <a:graphicData uri="http://schemas.openxmlformats.org/presentationml/2006/ole">
             <mc:AlternateContent xmlns:mc="http://schemas.openxmlformats.org/markup-compatibility/2006">
               <mc:Choice xmlns:v="urn:schemas-microsoft-com:vml" Requires="v">
-                <p:oleObj spid="_x0000_s82187" name="Equation" r:id="rId13" imgW="1892160" imgH="1346040" progId="Equation.DSMT4">
+                <p:oleObj spid="_x0000_s82196" name="Equation" r:id="rId13" imgW="1892160" imgH="1346040" progId="Equation.DSMT4">
                   <p:embed/>
                 </p:oleObj>
               </mc:Choice>
@@ -12989,7 +12988,7 @@
             <a:graphicData uri="http://schemas.openxmlformats.org/presentationml/2006/ole">
               <mc:AlternateContent xmlns:mc="http://schemas.openxmlformats.org/markup-compatibility/2006">
                 <mc:Choice xmlns:v="urn:schemas-microsoft-com:vml" Requires="v">
-                  <p:oleObj spid="_x0000_s82188" name="Equation" r:id="rId15" imgW="545760" imgH="3124080" progId="Equation.DSMT4">
+                  <p:oleObj spid="_x0000_s82197" name="Equation" r:id="rId15" imgW="545760" imgH="3124080" progId="Equation.DSMT4">
                     <p:embed/>
                   </p:oleObj>
                 </mc:Choice>
@@ -13059,7 +13058,7 @@
             <a:graphicData uri="http://schemas.openxmlformats.org/presentationml/2006/ole">
               <mc:AlternateContent xmlns:mc="http://schemas.openxmlformats.org/markup-compatibility/2006">
                 <mc:Choice xmlns:v="urn:schemas-microsoft-com:vml" Requires="v">
-                  <p:oleObj spid="_x0000_s82189" name="Equation" r:id="rId17" imgW="4076640" imgH="660240" progId="Equation.DSMT4">
+                  <p:oleObj spid="_x0000_s82198" name="Equation" r:id="rId17" imgW="4076640" imgH="660240" progId="Equation.DSMT4">
                     <p:embed/>
                   </p:oleObj>
                 </mc:Choice>
@@ -13840,7 +13839,7 @@
           <a:graphicData uri="http://schemas.openxmlformats.org/presentationml/2006/ole">
             <mc:AlternateContent xmlns:mc="http://schemas.openxmlformats.org/markup-compatibility/2006">
               <mc:Choice xmlns:v="urn:schemas-microsoft-com:vml" Requires="v">
-                <p:oleObj spid="_x0000_s82999" name="Equation" r:id="rId4" imgW="5461000" imgH="2133600" progId="Equation.DSMT4">
+                <p:oleObj spid="_x0000_s83001" name="Equation" r:id="rId4" imgW="5461000" imgH="2133600" progId="Equation.DSMT4">
                   <p:embed/>
                 </p:oleObj>
               </mc:Choice>
@@ -14047,7 +14046,7 @@
           <a:graphicData uri="http://schemas.openxmlformats.org/presentationml/2006/ole">
             <mc:AlternateContent xmlns:mc="http://schemas.openxmlformats.org/markup-compatibility/2006">
               <mc:Choice xmlns:v="urn:schemas-microsoft-com:vml" Requires="v">
-                <p:oleObj spid="_x0000_s135307" name="Equation" r:id="rId4" imgW="8013700" imgH="1562100" progId="Equation.DSMT4">
+                <p:oleObj spid="_x0000_s135312" name="Equation" r:id="rId4" imgW="8013700" imgH="1562100" progId="Equation.DSMT4">
                   <p:embed/>
                 </p:oleObj>
               </mc:Choice>
@@ -14117,7 +14116,7 @@
           <a:graphicData uri="http://schemas.openxmlformats.org/presentationml/2006/ole">
             <mc:AlternateContent xmlns:mc="http://schemas.openxmlformats.org/markup-compatibility/2006">
               <mc:Choice xmlns:v="urn:schemas-microsoft-com:vml" Requires="v">
-                <p:oleObj spid="_x0000_s135308" name="Equation" r:id="rId6" imgW="8280400" imgH="1574800" progId="Equation.3">
+                <p:oleObj spid="_x0000_s135313" name="Equation" r:id="rId6" imgW="8280400" imgH="1574800" progId="Equation.3">
                   <p:embed/>
                 </p:oleObj>
               </mc:Choice>
@@ -14265,7 +14264,7 @@
           <a:graphicData uri="http://schemas.openxmlformats.org/presentationml/2006/ole">
             <mc:AlternateContent xmlns:mc="http://schemas.openxmlformats.org/markup-compatibility/2006">
               <mc:Choice xmlns:v="urn:schemas-microsoft-com:vml" Requires="v">
-                <p:oleObj spid="_x0000_s135309" name="Equation" r:id="rId8" imgW="5168900" imgH="1574800" progId="Equation.3">
+                <p:oleObj spid="_x0000_s135314" name="Equation" r:id="rId8" imgW="5168900" imgH="1574800" progId="Equation.3">
                   <p:embed/>
                 </p:oleObj>
               </mc:Choice>
@@ -14335,7 +14334,7 @@
           <a:graphicData uri="http://schemas.openxmlformats.org/presentationml/2006/ole">
             <mc:AlternateContent xmlns:mc="http://schemas.openxmlformats.org/markup-compatibility/2006">
               <mc:Choice xmlns:v="urn:schemas-microsoft-com:vml" Requires="v">
-                <p:oleObj spid="_x0000_s135310" name="Equation" r:id="rId10" imgW="7632700" imgH="1511300" progId="Equation.3">
+                <p:oleObj spid="_x0000_s135315" name="Equation" r:id="rId10" imgW="7632700" imgH="1511300" progId="Equation.3">
                   <p:embed/>
                 </p:oleObj>
               </mc:Choice>
@@ -14927,7 +14926,7 @@
           <a:graphicData uri="http://schemas.openxmlformats.org/presentationml/2006/ole">
             <mc:AlternateContent xmlns:mc="http://schemas.openxmlformats.org/markup-compatibility/2006">
               <mc:Choice xmlns:v="urn:schemas-microsoft-com:vml" Requires="v">
-                <p:oleObj spid="_x0000_s84046" name="Equation" r:id="rId4" imgW="7251700" imgH="1092200" progId="Equation.3">
+                <p:oleObj spid="_x0000_s84049" name="Equation" r:id="rId4" imgW="7251700" imgH="1092200" progId="Equation.3">
                   <p:embed/>
                 </p:oleObj>
               </mc:Choice>
@@ -14991,7 +14990,7 @@
           <a:graphicData uri="http://schemas.openxmlformats.org/presentationml/2006/ole">
             <mc:AlternateContent xmlns:mc="http://schemas.openxmlformats.org/markup-compatibility/2006">
               <mc:Choice xmlns:v="urn:schemas-microsoft-com:vml" Requires="v">
-                <p:oleObj spid="_x0000_s84047" name="Equation" r:id="rId6" imgW="3390840" imgH="1269720" progId="Equation.DSMT4">
+                <p:oleObj spid="_x0000_s84050" name="Equation" r:id="rId6" imgW="3390840" imgH="1269720" progId="Equation.DSMT4">
                   <p:embed/>
                 </p:oleObj>
               </mc:Choice>
@@ -15271,7 +15270,7 @@
           <a:graphicData uri="http://schemas.openxmlformats.org/presentationml/2006/ole">
             <mc:AlternateContent xmlns:mc="http://schemas.openxmlformats.org/markup-compatibility/2006">
               <mc:Choice xmlns:v="urn:schemas-microsoft-com:vml" Requires="v">
-                <p:oleObj spid="_x0000_s85097" name="Equation" r:id="rId4" imgW="3479760" imgH="1269720" progId="Equation.DSMT4">
+                <p:oleObj spid="_x0000_s85101" name="Equation" r:id="rId4" imgW="3479760" imgH="1269720" progId="Equation.DSMT4">
                   <p:embed/>
                 </p:oleObj>
               </mc:Choice>
@@ -15341,7 +15340,7 @@
           <a:graphicData uri="http://schemas.openxmlformats.org/presentationml/2006/ole">
             <mc:AlternateContent xmlns:mc="http://schemas.openxmlformats.org/markup-compatibility/2006">
               <mc:Choice xmlns:v="urn:schemas-microsoft-com:vml" Requires="v">
-                <p:oleObj spid="_x0000_s85098" name="Equation" r:id="rId6" imgW="3251160" imgH="1269720" progId="Equation.DSMT4">
+                <p:oleObj spid="_x0000_s85102" name="Equation" r:id="rId6" imgW="3251160" imgH="1269720" progId="Equation.DSMT4">
                   <p:embed/>
                 </p:oleObj>
               </mc:Choice>
@@ -15411,7 +15410,7 @@
           <a:graphicData uri="http://schemas.openxmlformats.org/presentationml/2006/ole">
             <mc:AlternateContent xmlns:mc="http://schemas.openxmlformats.org/markup-compatibility/2006">
               <mc:Choice xmlns:v="urn:schemas-microsoft-com:vml" Requires="v">
-                <p:oleObj spid="_x0000_s85099" name="Equation" r:id="rId8" imgW="3504960" imgH="1346040" progId="Equation.DSMT4">
+                <p:oleObj spid="_x0000_s85103" name="Equation" r:id="rId8" imgW="3504960" imgH="1346040" progId="Equation.DSMT4">
                   <p:embed/>
                 </p:oleObj>
               </mc:Choice>

</xml_diff>